<commit_message>
simplify architecture diagram doc
</commit_message>
<xml_diff>
--- a/src/docs/Donkeylift.pptx
+++ b/src/docs/Donkeylift.pptx
@@ -254,7 +254,7 @@
           <a:p>
             <a:fld id="{F59A77A2-EFA2-4FFB-A7BE-B38DE55672F2}" type="datetimeFigureOut">
               <a:rPr lang="es-CL" smtClean="0"/>
-              <a:t>25-07-2016</a:t>
+              <a:t>02-08-2016</a:t>
             </a:fld>
             <a:endParaRPr lang="es-CL"/>
           </a:p>
@@ -424,7 +424,7 @@
           <a:p>
             <a:fld id="{F59A77A2-EFA2-4FFB-A7BE-B38DE55672F2}" type="datetimeFigureOut">
               <a:rPr lang="es-CL" smtClean="0"/>
-              <a:t>25-07-2016</a:t>
+              <a:t>02-08-2016</a:t>
             </a:fld>
             <a:endParaRPr lang="es-CL"/>
           </a:p>
@@ -604,7 +604,7 @@
           <a:p>
             <a:fld id="{F59A77A2-EFA2-4FFB-A7BE-B38DE55672F2}" type="datetimeFigureOut">
               <a:rPr lang="es-CL" smtClean="0"/>
-              <a:t>25-07-2016</a:t>
+              <a:t>02-08-2016</a:t>
             </a:fld>
             <a:endParaRPr lang="es-CL"/>
           </a:p>
@@ -774,7 +774,7 @@
           <a:p>
             <a:fld id="{F59A77A2-EFA2-4FFB-A7BE-B38DE55672F2}" type="datetimeFigureOut">
               <a:rPr lang="es-CL" smtClean="0"/>
-              <a:t>25-07-2016</a:t>
+              <a:t>02-08-2016</a:t>
             </a:fld>
             <a:endParaRPr lang="es-CL"/>
           </a:p>
@@ -1020,7 +1020,7 @@
           <a:p>
             <a:fld id="{F59A77A2-EFA2-4FFB-A7BE-B38DE55672F2}" type="datetimeFigureOut">
               <a:rPr lang="es-CL" smtClean="0"/>
-              <a:t>25-07-2016</a:t>
+              <a:t>02-08-2016</a:t>
             </a:fld>
             <a:endParaRPr lang="es-CL"/>
           </a:p>
@@ -1252,7 +1252,7 @@
           <a:p>
             <a:fld id="{F59A77A2-EFA2-4FFB-A7BE-B38DE55672F2}" type="datetimeFigureOut">
               <a:rPr lang="es-CL" smtClean="0"/>
-              <a:t>25-07-2016</a:t>
+              <a:t>02-08-2016</a:t>
             </a:fld>
             <a:endParaRPr lang="es-CL"/>
           </a:p>
@@ -1619,7 +1619,7 @@
           <a:p>
             <a:fld id="{F59A77A2-EFA2-4FFB-A7BE-B38DE55672F2}" type="datetimeFigureOut">
               <a:rPr lang="es-CL" smtClean="0"/>
-              <a:t>25-07-2016</a:t>
+              <a:t>02-08-2016</a:t>
             </a:fld>
             <a:endParaRPr lang="es-CL"/>
           </a:p>
@@ -1737,7 +1737,7 @@
           <a:p>
             <a:fld id="{F59A77A2-EFA2-4FFB-A7BE-B38DE55672F2}" type="datetimeFigureOut">
               <a:rPr lang="es-CL" smtClean="0"/>
-              <a:t>25-07-2016</a:t>
+              <a:t>02-08-2016</a:t>
             </a:fld>
             <a:endParaRPr lang="es-CL"/>
           </a:p>
@@ -1832,7 +1832,7 @@
           <a:p>
             <a:fld id="{F59A77A2-EFA2-4FFB-A7BE-B38DE55672F2}" type="datetimeFigureOut">
               <a:rPr lang="es-CL" smtClean="0"/>
-              <a:t>25-07-2016</a:t>
+              <a:t>02-08-2016</a:t>
             </a:fld>
             <a:endParaRPr lang="es-CL"/>
           </a:p>
@@ -2109,7 +2109,7 @@
           <a:p>
             <a:fld id="{F59A77A2-EFA2-4FFB-A7BE-B38DE55672F2}" type="datetimeFigureOut">
               <a:rPr lang="es-CL" smtClean="0"/>
-              <a:t>25-07-2016</a:t>
+              <a:t>02-08-2016</a:t>
             </a:fld>
             <a:endParaRPr lang="es-CL"/>
           </a:p>
@@ -2362,7 +2362,7 @@
           <a:p>
             <a:fld id="{F59A77A2-EFA2-4FFB-A7BE-B38DE55672F2}" type="datetimeFigureOut">
               <a:rPr lang="es-CL" smtClean="0"/>
-              <a:t>25-07-2016</a:t>
+              <a:t>02-08-2016</a:t>
             </a:fld>
             <a:endParaRPr lang="es-CL"/>
           </a:p>
@@ -2575,7 +2575,7 @@
           <a:p>
             <a:fld id="{F59A77A2-EFA2-4FFB-A7BE-B38DE55672F2}" type="datetimeFigureOut">
               <a:rPr lang="es-CL" smtClean="0"/>
-              <a:t>25-07-2016</a:t>
+              <a:t>02-08-2016</a:t>
             </a:fld>
             <a:endParaRPr lang="es-CL"/>
           </a:p>
@@ -3390,11 +3390,11 @@
   <p:clrMapOvr>
     <a:masterClrMapping/>
   </p:clrMapOvr>
-  <mc:AlternateContent xmlns:mc="http://schemas.openxmlformats.org/markup-compatibility/2006">
-    <mc:Choice xmlns:p14="http://schemas.microsoft.com/office/powerpoint/2010/main" Requires="p14">
+  <mc:AlternateContent xmlns:mc="http://schemas.openxmlformats.org/markup-compatibility/2006" xmlns:p14="http://schemas.microsoft.com/office/powerpoint/2010/main">
+    <mc:Choice Requires="p14">
       <p:transition spd="slow" p14:dur="2000"/>
     </mc:Choice>
-    <mc:Fallback>
+    <mc:Fallback xmlns="">
       <p:transition spd="slow"/>
     </mc:Fallback>
   </mc:AlternateContent>
@@ -3562,11 +3562,11 @@
   <p:clrMapOvr>
     <a:masterClrMapping/>
   </p:clrMapOvr>
-  <mc:AlternateContent xmlns:mc="http://schemas.openxmlformats.org/markup-compatibility/2006">
-    <mc:Choice xmlns:p14="http://schemas.microsoft.com/office/powerpoint/2010/main" Requires="p14">
+  <mc:AlternateContent xmlns:mc="http://schemas.openxmlformats.org/markup-compatibility/2006" xmlns:p14="http://schemas.microsoft.com/office/powerpoint/2010/main">
+    <mc:Choice Requires="p14">
       <p:transition spd="slow" p14:dur="2000"/>
     </mc:Choice>
-    <mc:Fallback>
+    <mc:Fallback xmlns="">
       <p:transition spd="slow"/>
     </mc:Fallback>
   </mc:AlternateContent>
@@ -3990,7 +3990,6 @@
               <a:rPr lang="es-AR" sz="3200" dirty="0" smtClean="0"/>
               <a:t>Data Browser - web app.</a:t>
             </a:r>
-            <a:endParaRPr lang="es-AR" sz="3200" dirty="0" smtClean="0"/>
           </a:p>
           <a:p>
             <a:pPr marL="514350" indent="-514350">
@@ -4036,11 +4035,7 @@
             </a:pPr>
             <a:r>
               <a:rPr lang="es-AR" sz="3200" dirty="0" smtClean="0"/>
-              <a:t>Data </a:t>
-            </a:r>
-            <a:r>
-              <a:rPr lang="es-AR" sz="3200" dirty="0" smtClean="0"/>
-              <a:t>Access </a:t>
+              <a:t>Data Access </a:t>
             </a:r>
             <a:r>
               <a:rPr lang="es-AR" sz="3200" dirty="0" err="1" smtClean="0"/>
@@ -4048,11 +4043,7 @@
             </a:r>
             <a:r>
               <a:rPr lang="es-AR" sz="3200" dirty="0" smtClean="0"/>
-              <a:t> </a:t>
-            </a:r>
-            <a:r>
-              <a:rPr lang="es-AR" sz="3200" dirty="0" smtClean="0"/>
-              <a:t>– web </a:t>
+              <a:t> – web </a:t>
             </a:r>
             <a:r>
               <a:rPr lang="es-AR" sz="3200" dirty="0" err="1" smtClean="0"/>
@@ -4061,10 +4052,6 @@
             <a:r>
               <a:rPr lang="es-AR" sz="3200" dirty="0" smtClean="0"/>
               <a:t>.</a:t>
-            </a:r>
-            <a:r>
-              <a:rPr lang="es-AR" sz="3200" dirty="0" smtClean="0"/>
-              <a:t/>
             </a:r>
             <a:br>
               <a:rPr lang="es-AR" sz="3200" dirty="0" smtClean="0"/>
@@ -4112,7 +4099,6 @@
               <a:rPr lang="es-AR" sz="3200" dirty="0" smtClean="0"/>
               <a:t>).</a:t>
             </a:r>
-            <a:endParaRPr lang="es-AR" sz="3200" dirty="0" smtClean="0"/>
           </a:p>
           <a:p>
             <a:pPr marL="514350" indent="-514350">
@@ -4185,7 +4171,7 @@
       </p:sp>
       <p:pic>
         <p:nvPicPr>
-          <p:cNvPr id="7" name="Picture 6"/>
+          <p:cNvPr id="4" name="Picture 3"/>
           <p:cNvPicPr>
             <a:picLocks noChangeAspect="1"/>
           </p:cNvPicPr>
@@ -4199,8 +4185,8 @@
         </p:blipFill>
         <p:spPr>
           <a:xfrm>
-            <a:off x="4783658" y="143903"/>
-            <a:ext cx="6610351" cy="6744782"/>
+            <a:off x="4798172" y="601123"/>
+            <a:ext cx="6412372" cy="6013459"/>
           </a:xfrm>
           <a:prstGeom prst="rect">
             <a:avLst/>

</xml_diff>

<commit_message>
minor wording changes to ppt
</commit_message>
<xml_diff>
--- a/src/docs/Donkeylift.pptx
+++ b/src/docs/Donkeylift.pptx
@@ -254,7 +254,7 @@
           <a:p>
             <a:fld id="{F59A77A2-EFA2-4FFB-A7BE-B38DE55672F2}" type="datetimeFigureOut">
               <a:rPr lang="es-CL" smtClean="0"/>
-              <a:t>02-08-2016</a:t>
+              <a:t>04-08-2016</a:t>
             </a:fld>
             <a:endParaRPr lang="es-CL"/>
           </a:p>
@@ -424,7 +424,7 @@
           <a:p>
             <a:fld id="{F59A77A2-EFA2-4FFB-A7BE-B38DE55672F2}" type="datetimeFigureOut">
               <a:rPr lang="es-CL" smtClean="0"/>
-              <a:t>02-08-2016</a:t>
+              <a:t>04-08-2016</a:t>
             </a:fld>
             <a:endParaRPr lang="es-CL"/>
           </a:p>
@@ -604,7 +604,7 @@
           <a:p>
             <a:fld id="{F59A77A2-EFA2-4FFB-A7BE-B38DE55672F2}" type="datetimeFigureOut">
               <a:rPr lang="es-CL" smtClean="0"/>
-              <a:t>02-08-2016</a:t>
+              <a:t>04-08-2016</a:t>
             </a:fld>
             <a:endParaRPr lang="es-CL"/>
           </a:p>
@@ -774,7 +774,7 @@
           <a:p>
             <a:fld id="{F59A77A2-EFA2-4FFB-A7BE-B38DE55672F2}" type="datetimeFigureOut">
               <a:rPr lang="es-CL" smtClean="0"/>
-              <a:t>02-08-2016</a:t>
+              <a:t>04-08-2016</a:t>
             </a:fld>
             <a:endParaRPr lang="es-CL"/>
           </a:p>
@@ -1020,7 +1020,7 @@
           <a:p>
             <a:fld id="{F59A77A2-EFA2-4FFB-A7BE-B38DE55672F2}" type="datetimeFigureOut">
               <a:rPr lang="es-CL" smtClean="0"/>
-              <a:t>02-08-2016</a:t>
+              <a:t>04-08-2016</a:t>
             </a:fld>
             <a:endParaRPr lang="es-CL"/>
           </a:p>
@@ -1252,7 +1252,7 @@
           <a:p>
             <a:fld id="{F59A77A2-EFA2-4FFB-A7BE-B38DE55672F2}" type="datetimeFigureOut">
               <a:rPr lang="es-CL" smtClean="0"/>
-              <a:t>02-08-2016</a:t>
+              <a:t>04-08-2016</a:t>
             </a:fld>
             <a:endParaRPr lang="es-CL"/>
           </a:p>
@@ -1619,7 +1619,7 @@
           <a:p>
             <a:fld id="{F59A77A2-EFA2-4FFB-A7BE-B38DE55672F2}" type="datetimeFigureOut">
               <a:rPr lang="es-CL" smtClean="0"/>
-              <a:t>02-08-2016</a:t>
+              <a:t>04-08-2016</a:t>
             </a:fld>
             <a:endParaRPr lang="es-CL"/>
           </a:p>
@@ -1737,7 +1737,7 @@
           <a:p>
             <a:fld id="{F59A77A2-EFA2-4FFB-A7BE-B38DE55672F2}" type="datetimeFigureOut">
               <a:rPr lang="es-CL" smtClean="0"/>
-              <a:t>02-08-2016</a:t>
+              <a:t>04-08-2016</a:t>
             </a:fld>
             <a:endParaRPr lang="es-CL"/>
           </a:p>
@@ -1832,7 +1832,7 @@
           <a:p>
             <a:fld id="{F59A77A2-EFA2-4FFB-A7BE-B38DE55672F2}" type="datetimeFigureOut">
               <a:rPr lang="es-CL" smtClean="0"/>
-              <a:t>02-08-2016</a:t>
+              <a:t>04-08-2016</a:t>
             </a:fld>
             <a:endParaRPr lang="es-CL"/>
           </a:p>
@@ -2109,7 +2109,7 @@
           <a:p>
             <a:fld id="{F59A77A2-EFA2-4FFB-A7BE-B38DE55672F2}" type="datetimeFigureOut">
               <a:rPr lang="es-CL" smtClean="0"/>
-              <a:t>02-08-2016</a:t>
+              <a:t>04-08-2016</a:t>
             </a:fld>
             <a:endParaRPr lang="es-CL"/>
           </a:p>
@@ -2362,7 +2362,7 @@
           <a:p>
             <a:fld id="{F59A77A2-EFA2-4FFB-A7BE-B38DE55672F2}" type="datetimeFigureOut">
               <a:rPr lang="es-CL" smtClean="0"/>
-              <a:t>02-08-2016</a:t>
+              <a:t>04-08-2016</a:t>
             </a:fld>
             <a:endParaRPr lang="es-CL"/>
           </a:p>
@@ -2575,7 +2575,7 @@
           <a:p>
             <a:fld id="{F59A77A2-EFA2-4FFB-A7BE-B38DE55672F2}" type="datetimeFigureOut">
               <a:rPr lang="es-CL" smtClean="0"/>
-              <a:t>02-08-2016</a:t>
+              <a:t>04-08-2016</a:t>
             </a:fld>
             <a:endParaRPr lang="es-CL"/>
           </a:p>
@@ -3031,11 +3031,11 @@
             </a:r>
             <a:r>
               <a:rPr lang="es-AR" dirty="0" err="1" smtClean="0"/>
-              <a:t>Relational</a:t>
+              <a:t>relational</a:t>
             </a:r>
             <a:r>
               <a:rPr lang="es-AR" dirty="0" smtClean="0"/>
-              <a:t> DBMS </a:t>
+              <a:t> data store </a:t>
             </a:r>
             <a:r>
               <a:rPr lang="es-AR" dirty="0" err="1" smtClean="0"/>
@@ -3644,11 +3644,7 @@
               <a:t> </a:t>
             </a:r>
             <a:r>
-              <a:rPr lang="es-AR" sz="3200" dirty="0"/>
-              <a:t>a </a:t>
-            </a:r>
-            <a:r>
-              <a:rPr lang="es-AR" sz="3200" dirty="0" err="1"/>
+              <a:rPr lang="es-AR" sz="3200" dirty="0" err="1" smtClean="0"/>
               <a:t>user-friendly</a:t>
             </a:r>
             <a:r>
@@ -3661,7 +3657,23 @@
             </a:r>
             <a:r>
               <a:rPr lang="es-AR" sz="3200" dirty="0"/>
-              <a:t> RDBMS. </a:t>
+              <a:t> </a:t>
+            </a:r>
+            <a:r>
+              <a:rPr lang="es-AR" sz="3200" dirty="0" smtClean="0"/>
+              <a:t>Data-as-a-</a:t>
+            </a:r>
+            <a:r>
+              <a:rPr lang="es-AR" sz="3200" dirty="0" err="1" smtClean="0"/>
+              <a:t>Service</a:t>
+            </a:r>
+            <a:r>
+              <a:rPr lang="es-AR" sz="3200" dirty="0" smtClean="0"/>
+              <a:t>. </a:t>
+            </a:r>
+            <a:r>
+              <a:rPr lang="es-AR" sz="3200" dirty="0"/>
+              <a:t/>
             </a:r>
             <a:br>
               <a:rPr lang="es-AR" sz="3200" dirty="0"/>
@@ -3670,32 +3682,6 @@
           </a:p>
           <a:p>
             <a:r>
-              <a:rPr lang="es-AR" sz="3200" dirty="0" smtClean="0"/>
-              <a:t>Reduce </a:t>
-            </a:r>
-            <a:r>
-              <a:rPr lang="es-AR" sz="3200" dirty="0" err="1" smtClean="0"/>
-              <a:t>implementation</a:t>
-            </a:r>
-            <a:r>
-              <a:rPr lang="es-AR" sz="3200" dirty="0" smtClean="0"/>
-              <a:t> times of new </a:t>
-            </a:r>
-            <a:r>
-              <a:rPr lang="es-AR" sz="3200" dirty="0" err="1" smtClean="0"/>
-              <a:t>databases</a:t>
-            </a:r>
-            <a:r>
-              <a:rPr lang="es-AR" sz="3200" dirty="0" smtClean="0"/>
-              <a:t>.</a:t>
-            </a:r>
-            <a:br>
-              <a:rPr lang="es-AR" sz="3200" dirty="0" smtClean="0"/>
-            </a:br>
-            <a:endParaRPr lang="es-AR" sz="3200" dirty="0" smtClean="0"/>
-          </a:p>
-          <a:p>
-            <a:r>
               <a:rPr lang="es-AR" sz="3200" dirty="0" err="1" smtClean="0"/>
               <a:t>Provide</a:t>
             </a:r>
@@ -3785,7 +3771,37 @@
           <a:p>
             <a:r>
               <a:rPr lang="es-AR" sz="3200" dirty="0"/>
-              <a:t>Share data </a:t>
+              <a:t>Reduce </a:t>
+            </a:r>
+            <a:r>
+              <a:rPr lang="es-AR" sz="3200" dirty="0" err="1"/>
+              <a:t>implementation</a:t>
+            </a:r>
+            <a:r>
+              <a:rPr lang="es-AR" sz="3200" dirty="0"/>
+              <a:t> times of new </a:t>
+            </a:r>
+            <a:r>
+              <a:rPr lang="es-AR" sz="3200" dirty="0" err="1"/>
+              <a:t>databases</a:t>
+            </a:r>
+            <a:r>
+              <a:rPr lang="es-AR" sz="3200"/>
+              <a:t>.</a:t>
+            </a:r>
+            <a:br>
+              <a:rPr lang="es-AR" sz="3200"/>
+            </a:br>
+            <a:endParaRPr lang="es-AR" sz="3200"/>
+          </a:p>
+          <a:p>
+            <a:r>
+              <a:rPr lang="es-AR" sz="3200" smtClean="0"/>
+              <a:t>Share </a:t>
+            </a:r>
+            <a:r>
+              <a:rPr lang="es-AR" sz="3200" dirty="0"/>
+              <a:t>data </a:t>
             </a:r>
             <a:r>
               <a:rPr lang="es-AR" sz="3200" dirty="0" err="1"/>

</xml_diff>